<commit_message>
Sunum dosyasının son hali
</commit_message>
<xml_diff>
--- a/database.pptx
+++ b/database.pptx
@@ -8,9 +8,9 @@
     <p:sldId id="257" r:id="rId2"/>
     <p:sldId id="262" r:id="rId3"/>
     <p:sldId id="264" r:id="rId4"/>
-    <p:sldId id="259" r:id="rId5"/>
-    <p:sldId id="260" r:id="rId6"/>
-    <p:sldId id="261" r:id="rId7"/>
+    <p:sldId id="261" r:id="rId5"/>
+    <p:sldId id="259" r:id="rId6"/>
+    <p:sldId id="260" r:id="rId7"/>
     <p:sldId id="266" r:id="rId8"/>
   </p:sldIdLst>
   <p:sldSz cx="12192000" cy="6858000"/>
@@ -116,6 +116,26 @@
     </p:ext>
   </p:extLst>
 </p:presentation>
+</file>
+
+<file path=ppt/commentAuthors.xml><?xml version="1.0" encoding="utf-8"?>
+<p:cmAuthorLst xmlns:a="http://schemas.openxmlformats.org/drawingml/2006/main" xmlns:r="http://schemas.openxmlformats.org/officeDocument/2006/relationships" xmlns:p="http://schemas.openxmlformats.org/presentationml/2006/main">
+  <p:cmAuthor id="1" name="red" initials="r" lastIdx="1" clrIdx="0">
+    <p:extLst>
+      <p:ext uri="{19B8F6BF-5375-455C-9EA6-DF929625EA0E}">
+        <p15:presenceInfo xmlns:p15="http://schemas.microsoft.com/office/powerpoint/2012/main" userId="red" providerId="None"/>
+      </p:ext>
+    </p:extLst>
+  </p:cmAuthor>
+</p:cmAuthorLst>
+</file>
+
+<file path=ppt/revisionInfo.xml><?xml version="1.0" encoding="utf-8"?>
+<p1510:revInfo xmlns:a="http://schemas.openxmlformats.org/drawingml/2006/main" xmlns:r="http://schemas.openxmlformats.org/officeDocument/2006/relationships" xmlns:p1510="http://schemas.microsoft.com/office/powerpoint/2015/10/main">
+  <p1510:revLst>
+    <p1510:client id="{31E1811C-6848-4BA9-8058-B5BA050CC80C}" v="79" dt="2019-04-21T11:07:50.379"/>
+  </p1510:revLst>
+</p1510:revInfo>
 </file>
 
 <file path=ppt/slideLayouts/slideLayout1.xml><?xml version="1.0" encoding="utf-8"?>
@@ -844,7 +864,7 @@
           <a:p>
             <a:fld id="{37E415D4-CC0C-4B37-B091-D4F1B0B8830E}" type="datetimeFigureOut">
               <a:rPr lang="tr-TR" smtClean="0"/>
-              <a:t>20.04.2019</a:t>
+              <a:t>22.04.2019</a:t>
             </a:fld>
             <a:endParaRPr lang="tr-TR"/>
           </a:p>
@@ -1095,7 +1115,7 @@
           <a:p>
             <a:fld id="{37E415D4-CC0C-4B37-B091-D4F1B0B8830E}" type="datetimeFigureOut">
               <a:rPr lang="tr-TR" smtClean="0"/>
-              <a:t>20.04.2019</a:t>
+              <a:t>22.04.2019</a:t>
             </a:fld>
             <a:endParaRPr lang="tr-TR"/>
           </a:p>
@@ -1409,7 +1429,7 @@
           <a:p>
             <a:fld id="{37E415D4-CC0C-4B37-B091-D4F1B0B8830E}" type="datetimeFigureOut">
               <a:rPr lang="tr-TR" smtClean="0"/>
-              <a:t>20.04.2019</a:t>
+              <a:t>22.04.2019</a:t>
             </a:fld>
             <a:endParaRPr lang="tr-TR"/>
           </a:p>
@@ -1736,7 +1756,7 @@
           <a:p>
             <a:fld id="{37E415D4-CC0C-4B37-B091-D4F1B0B8830E}" type="datetimeFigureOut">
               <a:rPr lang="tr-TR" smtClean="0"/>
-              <a:t>20.04.2019</a:t>
+              <a:t>22.04.2019</a:t>
             </a:fld>
             <a:endParaRPr lang="tr-TR"/>
           </a:p>
@@ -2050,7 +2070,7 @@
           <a:p>
             <a:fld id="{37E415D4-CC0C-4B37-B091-D4F1B0B8830E}" type="datetimeFigureOut">
               <a:rPr lang="tr-TR" smtClean="0"/>
-              <a:t>20.04.2019</a:t>
+              <a:t>22.04.2019</a:t>
             </a:fld>
             <a:endParaRPr lang="tr-TR"/>
           </a:p>
@@ -2437,7 +2457,7 @@
           <a:p>
             <a:fld id="{37E415D4-CC0C-4B37-B091-D4F1B0B8830E}" type="datetimeFigureOut">
               <a:rPr lang="tr-TR" smtClean="0"/>
-              <a:t>20.04.2019</a:t>
+              <a:t>22.04.2019</a:t>
             </a:fld>
             <a:endParaRPr lang="tr-TR"/>
           </a:p>
@@ -2607,7 +2627,7 @@
           <a:p>
             <a:fld id="{37E415D4-CC0C-4B37-B091-D4F1B0B8830E}" type="datetimeFigureOut">
               <a:rPr lang="tr-TR" smtClean="0"/>
-              <a:t>20.04.2019</a:t>
+              <a:t>22.04.2019</a:t>
             </a:fld>
             <a:endParaRPr lang="tr-TR"/>
           </a:p>
@@ -2787,7 +2807,7 @@
           <a:p>
             <a:fld id="{37E415D4-CC0C-4B37-B091-D4F1B0B8830E}" type="datetimeFigureOut">
               <a:rPr lang="tr-TR" smtClean="0"/>
-              <a:t>20.04.2019</a:t>
+              <a:t>22.04.2019</a:t>
             </a:fld>
             <a:endParaRPr lang="tr-TR"/>
           </a:p>
@@ -2957,7 +2977,7 @@
           <a:p>
             <a:fld id="{37E415D4-CC0C-4B37-B091-D4F1B0B8830E}" type="datetimeFigureOut">
               <a:rPr lang="tr-TR" smtClean="0"/>
-              <a:t>20.04.2019</a:t>
+              <a:t>22.04.2019</a:t>
             </a:fld>
             <a:endParaRPr lang="tr-TR"/>
           </a:p>
@@ -3204,7 +3224,7 @@
           <a:p>
             <a:fld id="{37E415D4-CC0C-4B37-B091-D4F1B0B8830E}" type="datetimeFigureOut">
               <a:rPr lang="tr-TR" smtClean="0"/>
-              <a:t>20.04.2019</a:t>
+              <a:t>22.04.2019</a:t>
             </a:fld>
             <a:endParaRPr lang="tr-TR"/>
           </a:p>
@@ -3436,7 +3456,7 @@
           <a:p>
             <a:fld id="{37E415D4-CC0C-4B37-B091-D4F1B0B8830E}" type="datetimeFigureOut">
               <a:rPr lang="tr-TR" smtClean="0"/>
-              <a:t>20.04.2019</a:t>
+              <a:t>22.04.2019</a:t>
             </a:fld>
             <a:endParaRPr lang="tr-TR"/>
           </a:p>
@@ -3810,7 +3830,7 @@
           <a:p>
             <a:fld id="{37E415D4-CC0C-4B37-B091-D4F1B0B8830E}" type="datetimeFigureOut">
               <a:rPr lang="tr-TR" smtClean="0"/>
-              <a:t>20.04.2019</a:t>
+              <a:t>22.04.2019</a:t>
             </a:fld>
             <a:endParaRPr lang="tr-TR"/>
           </a:p>
@@ -3933,7 +3953,7 @@
           <a:p>
             <a:fld id="{37E415D4-CC0C-4B37-B091-D4F1B0B8830E}" type="datetimeFigureOut">
               <a:rPr lang="tr-TR" smtClean="0"/>
-              <a:t>20.04.2019</a:t>
+              <a:t>22.04.2019</a:t>
             </a:fld>
             <a:endParaRPr lang="tr-TR"/>
           </a:p>
@@ -4028,7 +4048,7 @@
           <a:p>
             <a:fld id="{37E415D4-CC0C-4B37-B091-D4F1B0B8830E}" type="datetimeFigureOut">
               <a:rPr lang="tr-TR" smtClean="0"/>
-              <a:t>20.04.2019</a:t>
+              <a:t>22.04.2019</a:t>
             </a:fld>
             <a:endParaRPr lang="tr-TR"/>
           </a:p>
@@ -4283,7 +4303,7 @@
           <a:p>
             <a:fld id="{37E415D4-CC0C-4B37-B091-D4F1B0B8830E}" type="datetimeFigureOut">
               <a:rPr lang="tr-TR" smtClean="0"/>
-              <a:t>20.04.2019</a:t>
+              <a:t>22.04.2019</a:t>
             </a:fld>
             <a:endParaRPr lang="tr-TR"/>
           </a:p>
@@ -4546,7 +4566,7 @@
           <a:p>
             <a:fld id="{37E415D4-CC0C-4B37-B091-D4F1B0B8830E}" type="datetimeFigureOut">
               <a:rPr lang="tr-TR" smtClean="0"/>
-              <a:t>20.04.2019</a:t>
+              <a:t>22.04.2019</a:t>
             </a:fld>
             <a:endParaRPr lang="tr-TR"/>
           </a:p>
@@ -5291,7 +5311,7 @@
           <a:p>
             <a:fld id="{37E415D4-CC0C-4B37-B091-D4F1B0B8830E}" type="datetimeFigureOut">
               <a:rPr lang="tr-TR" smtClean="0"/>
-              <a:t>20.04.2019</a:t>
+              <a:t>22.04.2019</a:t>
             </a:fld>
             <a:endParaRPr lang="tr-TR"/>
           </a:p>
@@ -6193,7 +6213,7 @@
             </a:pPr>
             <a:r>
               <a:rPr lang="tr-TR" dirty="0"/>
-              <a:t>3 </a:t>
+              <a:t>2 </a:t>
             </a:r>
             <a:r>
               <a:rPr lang="tr-TR" dirty="0" err="1"/>
@@ -6210,14 +6230,6 @@
             <a:r>
               <a:rPr lang="tr-TR" dirty="0"/>
               <a:t>(</a:t>
-            </a:r>
-            <a:r>
-              <a:rPr lang="tr-TR" dirty="0" err="1"/>
-              <a:t>admin</a:t>
-            </a:r>
-            <a:r>
-              <a:rPr lang="tr-TR" dirty="0"/>
-              <a:t>/</a:t>
             </a:r>
             <a:r>
               <a:rPr lang="tr-TR" dirty="0" err="1"/>
@@ -6793,7 +6805,7 @@
           <p:cNvPr id="2" name="Unvan 1">
             <a:extLst>
               <a:ext uri="{FF2B5EF4-FFF2-40B4-BE49-F238E27FC236}">
-                <a16:creationId xmlns:a16="http://schemas.microsoft.com/office/drawing/2014/main" id="{CB945976-AC6F-4101-8BD6-07C5EA2D92C5}"/>
+                <a16:creationId xmlns:a16="http://schemas.microsoft.com/office/drawing/2014/main" id="{9384E831-6299-4F97-80B2-7F318981ED43}"/>
               </a:ext>
             </a:extLst>
           </p:cNvPr>
@@ -6804,77 +6816,59 @@
             <p:ph type="title"/>
           </p:nvPr>
         </p:nvSpPr>
-        <p:spPr/>
-        <p:txBody>
-          <a:bodyPr/>
+        <p:spPr>
+          <a:xfrm>
+            <a:off x="3453011" y="153028"/>
+            <a:ext cx="3854528" cy="330196"/>
+          </a:xfrm>
+        </p:spPr>
+        <p:txBody>
+          <a:bodyPr>
+            <a:normAutofit fontScale="90000"/>
+          </a:bodyPr>
           <a:lstStyle/>
           <a:p>
             <a:r>
               <a:rPr lang="tr-TR" dirty="0"/>
-              <a:t>Project </a:t>
-            </a:r>
-            <a:r>
-              <a:rPr lang="tr-TR" dirty="0" err="1"/>
-              <a:t>Classes</a:t>
-            </a:r>
-            <a:endParaRPr lang="tr-TR" dirty="0"/>
-          </a:p>
-        </p:txBody>
-      </p:sp>
-      <p:sp>
-        <p:nvSpPr>
-          <p:cNvPr id="3" name="İçerik Yer Tutucusu 2">
+              <a:t>Complete Diagram</a:t>
+            </a:r>
+          </a:p>
+        </p:txBody>
+      </p:sp>
+      <p:pic>
+        <p:nvPicPr>
+          <p:cNvPr id="5" name="Resim 4">
             <a:extLst>
               <a:ext uri="{FF2B5EF4-FFF2-40B4-BE49-F238E27FC236}">
-                <a16:creationId xmlns:a16="http://schemas.microsoft.com/office/drawing/2014/main" id="{C6AA1F20-3C5D-461D-9DCA-57BD31139D01}"/>
+                <a16:creationId xmlns:a16="http://schemas.microsoft.com/office/drawing/2014/main" id="{0565B725-8267-429C-B24D-332953147E31}"/>
               </a:ext>
             </a:extLst>
           </p:cNvPr>
-          <p:cNvSpPr>
-            <a:spLocks noGrp="1"/>
-          </p:cNvSpPr>
-          <p:nvPr>
-            <p:ph idx="1"/>
-          </p:nvPr>
-        </p:nvSpPr>
-        <p:spPr/>
-        <p:txBody>
-          <a:bodyPr/>
-          <a:lstStyle/>
-          <a:p>
-            <a:endParaRPr lang="tr-TR"/>
-          </a:p>
-        </p:txBody>
-      </p:sp>
-      <p:sp>
-        <p:nvSpPr>
-          <p:cNvPr id="4" name="Metin Yer Tutucusu 3">
-            <a:extLst>
-              <a:ext uri="{FF2B5EF4-FFF2-40B4-BE49-F238E27FC236}">
-                <a16:creationId xmlns:a16="http://schemas.microsoft.com/office/drawing/2014/main" id="{33C2C267-8631-4248-A575-44E340C94BFF}"/>
-              </a:ext>
-            </a:extLst>
-          </p:cNvPr>
-          <p:cNvSpPr>
-            <a:spLocks noGrp="1"/>
-          </p:cNvSpPr>
-          <p:nvPr>
-            <p:ph type="body" sz="half" idx="2"/>
-          </p:nvPr>
-        </p:nvSpPr>
-        <p:spPr/>
-        <p:txBody>
-          <a:bodyPr/>
-          <a:lstStyle/>
-          <a:p>
-            <a:endParaRPr lang="tr-TR"/>
-          </a:p>
-        </p:txBody>
-      </p:sp>
+          <p:cNvPicPr>
+            <a:picLocks noChangeAspect="1"/>
+          </p:cNvPicPr>
+          <p:nvPr/>
+        </p:nvPicPr>
+        <p:blipFill>
+          <a:blip r:embed="rId2"/>
+          <a:stretch>
+            <a:fillRect/>
+          </a:stretch>
+        </p:blipFill>
+        <p:spPr>
+          <a:xfrm>
+            <a:off x="909221" y="483224"/>
+            <a:ext cx="8288965" cy="6374776"/>
+          </a:xfrm>
+          <a:prstGeom prst="rect">
+            <a:avLst/>
+          </a:prstGeom>
+        </p:spPr>
+      </p:pic>
     </p:spTree>
     <p:extLst>
       <p:ext uri="{BB962C8B-B14F-4D97-AF65-F5344CB8AC3E}">
-        <p14:creationId xmlns:p14="http://schemas.microsoft.com/office/powerpoint/2010/main" val="3211797041"/>
+        <p14:creationId xmlns:p14="http://schemas.microsoft.com/office/powerpoint/2010/main" val="4024091842"/>
       </p:ext>
     </p:extLst>
   </p:cSld>
@@ -6906,7 +6900,7 @@
           <p:cNvPr id="2" name="Unvan 1">
             <a:extLst>
               <a:ext uri="{FF2B5EF4-FFF2-40B4-BE49-F238E27FC236}">
-                <a16:creationId xmlns:a16="http://schemas.microsoft.com/office/drawing/2014/main" id="{8057793C-08C2-4297-9CD6-2CD80D7E9416}"/>
+                <a16:creationId xmlns:a16="http://schemas.microsoft.com/office/drawing/2014/main" id="{CB945976-AC6F-4101-8BD6-07C5EA2D92C5}"/>
               </a:ext>
             </a:extLst>
           </p:cNvPr>
@@ -6917,73 +6911,168 @@
             <p:ph type="title"/>
           </p:nvPr>
         </p:nvSpPr>
-        <p:spPr/>
-        <p:txBody>
-          <a:bodyPr/>
-          <a:lstStyle/>
-          <a:p>
-            <a:r>
-              <a:rPr lang="tr-TR" dirty="0" err="1"/>
-              <a:t>Tables</a:t>
-            </a:r>
-            <a:endParaRPr lang="tr-TR" dirty="0"/>
-          </a:p>
-        </p:txBody>
-      </p:sp>
-      <p:sp>
-        <p:nvSpPr>
-          <p:cNvPr id="3" name="İçerik Yer Tutucusu 2">
+        <p:spPr>
+          <a:xfrm>
+            <a:off x="360479" y="437940"/>
+            <a:ext cx="7430394" cy="807716"/>
+          </a:xfrm>
+        </p:spPr>
+        <p:txBody>
+          <a:bodyPr>
+            <a:normAutofit fontScale="90000"/>
+          </a:bodyPr>
+          <a:lstStyle/>
+          <a:p>
+            <a:r>
+              <a:rPr lang="tr-TR" sz="3100" dirty="0"/>
+              <a:t>Project </a:t>
+            </a:r>
+            <a:r>
+              <a:rPr lang="tr-TR" sz="3100" dirty="0" err="1"/>
+              <a:t>class</a:t>
+            </a:r>
+            <a:r>
+              <a:rPr lang="tr-TR" sz="3100" dirty="0"/>
+              <a:t> </a:t>
+            </a:r>
+            <a:r>
+              <a:rPr lang="tr-TR" sz="3100" dirty="0" err="1"/>
+              <a:t>and</a:t>
+            </a:r>
+            <a:r>
+              <a:rPr lang="tr-TR" sz="3100" dirty="0"/>
+              <a:t> </a:t>
+            </a:r>
+            <a:r>
+              <a:rPr lang="tr-TR" sz="3100" dirty="0" err="1"/>
+              <a:t>database</a:t>
+            </a:r>
+            <a:r>
+              <a:rPr lang="tr-TR" sz="3100" dirty="0"/>
+              <a:t> </a:t>
+            </a:r>
+            <a:r>
+              <a:rPr lang="tr-TR" sz="3100" dirty="0" err="1"/>
+              <a:t>table</a:t>
+            </a:r>
+            <a:r>
+              <a:rPr lang="tr-TR" sz="3100" dirty="0"/>
+              <a:t> </a:t>
+            </a:r>
+            <a:r>
+              <a:rPr lang="tr-TR" sz="3100" dirty="0" err="1"/>
+              <a:t>relations</a:t>
+            </a:r>
+            <a:r>
+              <a:rPr lang="tr-TR" sz="3100" dirty="0"/>
+              <a:t>…</a:t>
+            </a:r>
+            <a:br>
+              <a:rPr lang="tr-TR" sz="2400" dirty="0"/>
+            </a:br>
+            <a:endParaRPr lang="tr-TR" sz="2400" dirty="0"/>
+          </a:p>
+        </p:txBody>
+      </p:sp>
+      <p:pic>
+        <p:nvPicPr>
+          <p:cNvPr id="5" name="Resim 4">
             <a:extLst>
               <a:ext uri="{FF2B5EF4-FFF2-40B4-BE49-F238E27FC236}">
-                <a16:creationId xmlns:a16="http://schemas.microsoft.com/office/drawing/2014/main" id="{4BD60C5B-AAEA-4B3C-A243-8BC0ADA818F5}"/>
+                <a16:creationId xmlns:a16="http://schemas.microsoft.com/office/drawing/2014/main" id="{EFAB6C36-7D9E-4691-AFC2-8A79311A72BE}"/>
               </a:ext>
             </a:extLst>
           </p:cNvPr>
-          <p:cNvSpPr>
-            <a:spLocks noGrp="1"/>
-          </p:cNvSpPr>
-          <p:nvPr>
-            <p:ph idx="1"/>
-          </p:nvPr>
-        </p:nvSpPr>
-        <p:spPr/>
-        <p:txBody>
-          <a:bodyPr/>
-          <a:lstStyle/>
-          <a:p>
-            <a:endParaRPr lang="tr-TR"/>
-          </a:p>
-        </p:txBody>
-      </p:sp>
-      <p:sp>
-        <p:nvSpPr>
-          <p:cNvPr id="4" name="Metin Yer Tutucusu 3">
+          <p:cNvPicPr>
+            <a:picLocks noChangeAspect="1"/>
+          </p:cNvPicPr>
+          <p:nvPr/>
+        </p:nvPicPr>
+        <p:blipFill>
+          <a:blip r:embed="rId2"/>
+          <a:stretch>
+            <a:fillRect/>
+          </a:stretch>
+        </p:blipFill>
+        <p:spPr>
+          <a:xfrm>
+            <a:off x="360479" y="2323586"/>
+            <a:ext cx="4381690" cy="2681510"/>
+          </a:xfrm>
+          <a:prstGeom prst="rect">
+            <a:avLst/>
+          </a:prstGeom>
+        </p:spPr>
+      </p:pic>
+      <p:pic>
+        <p:nvPicPr>
+          <p:cNvPr id="6" name="Resim 5">
             <a:extLst>
               <a:ext uri="{FF2B5EF4-FFF2-40B4-BE49-F238E27FC236}">
-                <a16:creationId xmlns:a16="http://schemas.microsoft.com/office/drawing/2014/main" id="{D73CF56F-E7E0-4EAC-8B2D-DB343D1AAF3D}"/>
+                <a16:creationId xmlns:a16="http://schemas.microsoft.com/office/drawing/2014/main" id="{485B3E92-D301-4A22-A86A-6840D4D3F185}"/>
               </a:ext>
             </a:extLst>
           </p:cNvPr>
-          <p:cNvSpPr>
-            <a:spLocks noGrp="1"/>
-          </p:cNvSpPr>
-          <p:nvPr>
-            <p:ph type="body" sz="half" idx="2"/>
-          </p:nvPr>
-        </p:nvSpPr>
-        <p:spPr/>
-        <p:txBody>
-          <a:bodyPr/>
-          <a:lstStyle/>
-          <a:p>
-            <a:endParaRPr lang="tr-TR"/>
+          <p:cNvPicPr>
+            <a:picLocks noChangeAspect="1"/>
+          </p:cNvPicPr>
+          <p:nvPr/>
+        </p:nvPicPr>
+        <p:blipFill>
+          <a:blip r:embed="rId3"/>
+          <a:stretch>
+            <a:fillRect/>
+          </a:stretch>
+        </p:blipFill>
+        <p:spPr>
+          <a:xfrm>
+            <a:off x="5393093" y="1587815"/>
+            <a:ext cx="3476095" cy="3682369"/>
+          </a:xfrm>
+          <a:prstGeom prst="rect">
+            <a:avLst/>
+          </a:prstGeom>
+        </p:spPr>
+      </p:pic>
+      <p:sp>
+        <p:nvSpPr>
+          <p:cNvPr id="3" name="Metin kutusu 2">
+            <a:extLst>
+              <a:ext uri="{FF2B5EF4-FFF2-40B4-BE49-F238E27FC236}">
+                <a16:creationId xmlns:a16="http://schemas.microsoft.com/office/drawing/2014/main" id="{8B849FED-9585-4814-A19F-0726B9A35EC8}"/>
+              </a:ext>
+            </a:extLst>
+          </p:cNvPr>
+          <p:cNvSpPr txBox="1"/>
+          <p:nvPr/>
+        </p:nvSpPr>
+        <p:spPr>
+          <a:xfrm>
+            <a:off x="360479" y="1599955"/>
+            <a:ext cx="4086808" cy="369332"/>
+          </a:xfrm>
+          <a:prstGeom prst="rect">
+            <a:avLst/>
+          </a:prstGeom>
+          <a:noFill/>
+        </p:spPr>
+        <p:txBody>
+          <a:bodyPr wrap="square" rtlCol="0">
+            <a:spAutoFit/>
+          </a:bodyPr>
+          <a:lstStyle/>
+          <a:p>
+            <a:r>
+              <a:rPr lang="tr-TR" dirty="0"/>
+              <a:t>Example1: Product</a:t>
+            </a:r>
           </a:p>
         </p:txBody>
       </p:sp>
     </p:spTree>
     <p:extLst>
       <p:ext uri="{BB962C8B-B14F-4D97-AF65-F5344CB8AC3E}">
-        <p14:creationId xmlns:p14="http://schemas.microsoft.com/office/powerpoint/2010/main" val="3956724772"/>
+        <p14:creationId xmlns:p14="http://schemas.microsoft.com/office/powerpoint/2010/main" val="3211797041"/>
       </p:ext>
     </p:extLst>
   </p:cSld>
@@ -7015,7 +7104,7 @@
           <p:cNvPr id="2" name="Unvan 1">
             <a:extLst>
               <a:ext uri="{FF2B5EF4-FFF2-40B4-BE49-F238E27FC236}">
-                <a16:creationId xmlns:a16="http://schemas.microsoft.com/office/drawing/2014/main" id="{9384E831-6299-4F97-80B2-7F318981ED43}"/>
+                <a16:creationId xmlns:a16="http://schemas.microsoft.com/office/drawing/2014/main" id="{8057793C-08C2-4297-9CD6-2CD80D7E9416}"/>
               </a:ext>
             </a:extLst>
           </p:cNvPr>
@@ -7026,77 +7115,106 @@
             <p:ph type="title"/>
           </p:nvPr>
         </p:nvSpPr>
-        <p:spPr/>
-        <p:txBody>
-          <a:bodyPr/>
-          <a:lstStyle/>
-          <a:p>
-            <a:r>
-              <a:rPr lang="tr-TR" dirty="0"/>
-              <a:t>Complete </a:t>
-            </a:r>
-            <a:r>
-              <a:rPr lang="tr-TR" dirty="0" err="1"/>
-              <a:t>Diagram</a:t>
-            </a:r>
-            <a:endParaRPr lang="tr-TR" dirty="0"/>
-          </a:p>
-        </p:txBody>
-      </p:sp>
-      <p:sp>
-        <p:nvSpPr>
-          <p:cNvPr id="3" name="İçerik Yer Tutucusu 2">
+        <p:spPr>
+          <a:xfrm>
+            <a:off x="401002" y="1424050"/>
+            <a:ext cx="3854528" cy="584196"/>
+          </a:xfrm>
+        </p:spPr>
+        <p:txBody>
+          <a:bodyPr>
+            <a:normAutofit/>
+          </a:bodyPr>
+          <a:lstStyle/>
+          <a:p>
+            <a:r>
+              <a:rPr lang="tr-TR" sz="1800" dirty="0">
+                <a:solidFill>
+                  <a:schemeClr val="tx1"/>
+                </a:solidFill>
+              </a:rPr>
+              <a:t>Example2: </a:t>
+            </a:r>
+            <a:r>
+              <a:rPr lang="tr-TR" sz="1800" dirty="0" err="1">
+                <a:solidFill>
+                  <a:schemeClr val="tx1"/>
+                </a:solidFill>
+              </a:rPr>
+              <a:t>OrderDetail</a:t>
+            </a:r>
+            <a:endParaRPr lang="tr-TR" sz="1800" dirty="0">
+              <a:solidFill>
+                <a:schemeClr val="tx1"/>
+              </a:solidFill>
+            </a:endParaRPr>
+          </a:p>
+        </p:txBody>
+      </p:sp>
+      <p:pic>
+        <p:nvPicPr>
+          <p:cNvPr id="6" name="Resim 5">
             <a:extLst>
               <a:ext uri="{FF2B5EF4-FFF2-40B4-BE49-F238E27FC236}">
-                <a16:creationId xmlns:a16="http://schemas.microsoft.com/office/drawing/2014/main" id="{AAAAC2C0-74E5-465C-863C-ADA61098F259}"/>
+                <a16:creationId xmlns:a16="http://schemas.microsoft.com/office/drawing/2014/main" id="{00EE58DE-050A-4471-8966-A4FE2176EB5B}"/>
               </a:ext>
             </a:extLst>
           </p:cNvPr>
-          <p:cNvSpPr>
-            <a:spLocks noGrp="1"/>
-          </p:cNvSpPr>
-          <p:nvPr>
-            <p:ph idx="1"/>
-          </p:nvPr>
-        </p:nvSpPr>
-        <p:spPr/>
-        <p:txBody>
-          <a:bodyPr/>
-          <a:lstStyle/>
-          <a:p>
-            <a:endParaRPr lang="tr-TR"/>
-          </a:p>
-        </p:txBody>
-      </p:sp>
-      <p:sp>
-        <p:nvSpPr>
-          <p:cNvPr id="4" name="Metin Yer Tutucusu 3">
+          <p:cNvPicPr>
+            <a:picLocks noChangeAspect="1"/>
+          </p:cNvPicPr>
+          <p:nvPr/>
+        </p:nvPicPr>
+        <p:blipFill>
+          <a:blip r:embed="rId2"/>
+          <a:stretch>
+            <a:fillRect/>
+          </a:stretch>
+        </p:blipFill>
+        <p:spPr>
+          <a:xfrm>
+            <a:off x="401002" y="2379662"/>
+            <a:ext cx="4264722" cy="2568258"/>
+          </a:xfrm>
+          <a:prstGeom prst="rect">
+            <a:avLst/>
+          </a:prstGeom>
+        </p:spPr>
+      </p:pic>
+      <p:pic>
+        <p:nvPicPr>
+          <p:cNvPr id="7" name="Resim 6">
             <a:extLst>
               <a:ext uri="{FF2B5EF4-FFF2-40B4-BE49-F238E27FC236}">
-                <a16:creationId xmlns:a16="http://schemas.microsoft.com/office/drawing/2014/main" id="{C5441DAF-F230-404C-AAB3-D3EF39761C37}"/>
+                <a16:creationId xmlns:a16="http://schemas.microsoft.com/office/drawing/2014/main" id="{6E334C43-FB12-4D30-B157-69688838CC62}"/>
               </a:ext>
             </a:extLst>
           </p:cNvPr>
-          <p:cNvSpPr>
-            <a:spLocks noGrp="1"/>
-          </p:cNvSpPr>
-          <p:nvPr>
-            <p:ph type="body" sz="half" idx="2"/>
-          </p:nvPr>
-        </p:nvSpPr>
-        <p:spPr/>
-        <p:txBody>
-          <a:bodyPr/>
-          <a:lstStyle/>
-          <a:p>
-            <a:endParaRPr lang="tr-TR"/>
-          </a:p>
-        </p:txBody>
-      </p:sp>
+          <p:cNvPicPr>
+            <a:picLocks noChangeAspect="1"/>
+          </p:cNvPicPr>
+          <p:nvPr/>
+        </p:nvPicPr>
+        <p:blipFill>
+          <a:blip r:embed="rId3"/>
+          <a:stretch>
+            <a:fillRect/>
+          </a:stretch>
+        </p:blipFill>
+        <p:spPr>
+          <a:xfrm>
+            <a:off x="5495729" y="2008246"/>
+            <a:ext cx="2983813" cy="2939674"/>
+          </a:xfrm>
+          <a:prstGeom prst="rect">
+            <a:avLst/>
+          </a:prstGeom>
+        </p:spPr>
+      </p:pic>
     </p:spTree>
     <p:extLst>
       <p:ext uri="{BB962C8B-B14F-4D97-AF65-F5344CB8AC3E}">
-        <p14:creationId xmlns:p14="http://schemas.microsoft.com/office/powerpoint/2010/main" val="4024091842"/>
+        <p14:creationId xmlns:p14="http://schemas.microsoft.com/office/powerpoint/2010/main" val="3956724772"/>
       </p:ext>
     </p:extLst>
   </p:cSld>
@@ -7141,8 +7259,8 @@
         </p:nvSpPr>
         <p:spPr>
           <a:xfrm>
-            <a:off x="928570" y="4669971"/>
-            <a:ext cx="7766936" cy="1646302"/>
+            <a:off x="2999205" y="2793999"/>
+            <a:ext cx="6193590" cy="1270001"/>
           </a:xfrm>
         </p:spPr>
         <p:txBody>
@@ -7151,8 +7269,40 @@
           <a:p>
             <a:pPr algn="l"/>
             <a:r>
-              <a:rPr lang="tr-TR" sz="4000" dirty="0"/>
-              <a:t>Demo</a:t>
+              <a:rPr lang="tr-TR" sz="2400" dirty="0"/>
+              <a:t>Time </a:t>
+            </a:r>
+            <a:r>
+              <a:rPr lang="tr-TR" sz="2400" dirty="0" err="1"/>
+              <a:t>to</a:t>
+            </a:r>
+            <a:r>
+              <a:rPr lang="tr-TR" sz="2400" dirty="0"/>
+              <a:t> </a:t>
+            </a:r>
+            <a:r>
+              <a:rPr lang="tr-TR" sz="2400" dirty="0" err="1"/>
+              <a:t>see</a:t>
+            </a:r>
+            <a:r>
+              <a:rPr lang="tr-TR" sz="2400" dirty="0"/>
+              <a:t> </a:t>
+            </a:r>
+            <a:r>
+              <a:rPr lang="tr-TR" sz="2400" dirty="0" err="1"/>
+              <a:t>our</a:t>
+            </a:r>
+            <a:r>
+              <a:rPr lang="tr-TR" sz="2400" dirty="0"/>
+              <a:t> </a:t>
+            </a:r>
+            <a:r>
+              <a:rPr lang="tr-TR" sz="2400" dirty="0" err="1"/>
+              <a:t>demo</a:t>
+            </a:r>
+            <a:r>
+              <a:rPr lang="tr-TR" sz="2400" dirty="0"/>
+              <a:t>.</a:t>
             </a:r>
             <a:br>
               <a:rPr lang="tr-TR" sz="4000" dirty="0"/>

</xml_diff>